<commit_message>
Updates after delivery at CME G~roup in Dec 17
</commit_message>
<xml_diff>
--- a/04-refactoring_cookbooks_with_tests.pptx
+++ b/04-refactoring_cookbooks_with_tests.pptx
@@ -5300,23 +5300,7 @@
             </a:r>
             <a:r>
               <a:rPr lang="en-US" baseline="0" dirty="0" smtClean="0"/>
-              <a:t> initial implementation of the default recipe for the </a:t>
-            </a:r>
-            <a:r>
-              <a:rPr lang="en-US" baseline="0" dirty="0" smtClean="0"/>
-              <a:t>apache </a:t>
-            </a:r>
-            <a:r>
-              <a:rPr lang="en-US" baseline="0" dirty="0" smtClean="0"/>
-              <a:t>cookbook defined the entire installation, configuration, and management of the service within a single recipe. This implementation has the benefit of being entirely readable from a single recipe. However, it does not easily allow for other cookbooks that may want to use the </a:t>
-            </a:r>
-            <a:r>
-              <a:rPr lang="en-US" baseline="0" dirty="0" smtClean="0"/>
-              <a:t>apache </a:t>
-            </a:r>
-            <a:r>
-              <a:rPr lang="en-US" baseline="0" dirty="0" smtClean="0"/>
-              <a:t>cookbook to easily choose the components that it may need.</a:t>
+              <a:t> initial implementation of the default recipe for the apache cookbook defined the entire installation, configuration, and management of the service within a single recipe. This implementation has the benefit of being entirely readable from a single recipe. However, it does not easily allow for other cookbooks that may want to use the apache cookbook to easily choose the components that it may need.</a:t>
             </a:r>
           </a:p>
           <a:p>
@@ -8408,14 +8392,14 @@
           </a:ln>
           <a:extLst>
             <a:ext uri="{909E8E84-426E-40dd-AFC4-6F175D3DCCD1}">
-              <a14:hiddenFill xmlns:a14="http://schemas.microsoft.com/office/drawing/2010/main" xmlns="">
+              <a14:hiddenFill xmlns="" xmlns:a14="http://schemas.microsoft.com/office/drawing/2010/main">
                 <a:solidFill>
                   <a:srgbClr val="FFFFFF"/>
                 </a:solidFill>
               </a14:hiddenFill>
             </a:ext>
             <a:ext uri="{91240B29-F687-4f45-9708-019B960494DF}">
-              <a14:hiddenLine xmlns:a14="http://schemas.microsoft.com/office/drawing/2010/main" xmlns="" w="9525">
+              <a14:hiddenLine xmlns="" xmlns:a14="http://schemas.microsoft.com/office/drawing/2010/main" w="9525">
                 <a:solidFill>
                   <a:srgbClr val="000000"/>
                 </a:solidFill>
@@ -8563,14 +8547,14 @@
           </a:ln>
           <a:extLst>
             <a:ext uri="{909E8E84-426E-40dd-AFC4-6F175D3DCCD1}">
-              <a14:hiddenFill xmlns:a14="http://schemas.microsoft.com/office/drawing/2010/main" xmlns="">
+              <a14:hiddenFill xmlns="" xmlns:a14="http://schemas.microsoft.com/office/drawing/2010/main">
                 <a:solidFill>
                   <a:srgbClr val="FFFFFF"/>
                 </a:solidFill>
               </a14:hiddenFill>
             </a:ext>
             <a:ext uri="{91240B29-F687-4f45-9708-019B960494DF}">
-              <a14:hiddenLine xmlns:a14="http://schemas.microsoft.com/office/drawing/2010/main" xmlns="" w="9525">
+              <a14:hiddenLine xmlns="" xmlns:a14="http://schemas.microsoft.com/office/drawing/2010/main" w="9525">
                 <a:solidFill>
                   <a:srgbClr val="000000"/>
                 </a:solidFill>
@@ -9061,14 +9045,14 @@
           </a:ln>
           <a:extLst>
             <a:ext uri="{909E8E84-426E-40dd-AFC4-6F175D3DCCD1}">
-              <a14:hiddenFill xmlns:a14="http://schemas.microsoft.com/office/drawing/2010/main" xmlns="">
+              <a14:hiddenFill xmlns="" xmlns:a14="http://schemas.microsoft.com/office/drawing/2010/main">
                 <a:solidFill>
                   <a:srgbClr val="FFFFFF"/>
                 </a:solidFill>
               </a14:hiddenFill>
             </a:ext>
             <a:ext uri="{91240B29-F687-4f45-9708-019B960494DF}">
-              <a14:hiddenLine xmlns:a14="http://schemas.microsoft.com/office/drawing/2010/main" xmlns="" w="9525">
+              <a14:hiddenLine xmlns="" xmlns:a14="http://schemas.microsoft.com/office/drawing/2010/main" w="9525">
                 <a:solidFill>
                   <a:srgbClr val="000000"/>
                 </a:solidFill>
@@ -10517,14 +10501,14 @@
           </a:ln>
           <a:extLst>
             <a:ext uri="{909E8E84-426E-40dd-AFC4-6F175D3DCCD1}">
-              <a14:hiddenFill xmlns:a14="http://schemas.microsoft.com/office/drawing/2010/main" xmlns="">
+              <a14:hiddenFill xmlns="" xmlns:a14="http://schemas.microsoft.com/office/drawing/2010/main">
                 <a:solidFill>
                   <a:srgbClr val="FFFFFF"/>
                 </a:solidFill>
               </a14:hiddenFill>
             </a:ext>
             <a:ext uri="{91240B29-F687-4f45-9708-019B960494DF}">
-              <a14:hiddenLine xmlns:a14="http://schemas.microsoft.com/office/drawing/2010/main" xmlns="" w="9525">
+              <a14:hiddenLine xmlns="" xmlns:a14="http://schemas.microsoft.com/office/drawing/2010/main" w="9525">
                 <a:solidFill>
                   <a:srgbClr val="000000"/>
                 </a:solidFill>
@@ -11878,14 +11862,14 @@
           </a:ln>
           <a:extLst>
             <a:ext uri="{909E8E84-426E-40dd-AFC4-6F175D3DCCD1}">
-              <a14:hiddenFill xmlns:a14="http://schemas.microsoft.com/office/drawing/2010/main" xmlns="">
+              <a14:hiddenFill xmlns="" xmlns:a14="http://schemas.microsoft.com/office/drawing/2010/main">
                 <a:solidFill>
                   <a:srgbClr val="FFFFFF"/>
                 </a:solidFill>
               </a14:hiddenFill>
             </a:ext>
             <a:ext uri="{91240B29-F687-4f45-9708-019B960494DF}">
-              <a14:hiddenLine xmlns:a14="http://schemas.microsoft.com/office/drawing/2010/main" xmlns="" w="9525">
+              <a14:hiddenLine xmlns="" xmlns:a14="http://schemas.microsoft.com/office/drawing/2010/main" w="9525">
                 <a:solidFill>
                   <a:srgbClr val="000000"/>
                 </a:solidFill>
@@ -12443,14 +12427,14 @@
           </a:ln>
           <a:extLst>
             <a:ext uri="{909E8E84-426E-40dd-AFC4-6F175D3DCCD1}">
-              <a14:hiddenFill xmlns:a14="http://schemas.microsoft.com/office/drawing/2010/main" xmlns="">
+              <a14:hiddenFill xmlns="" xmlns:a14="http://schemas.microsoft.com/office/drawing/2010/main">
                 <a:solidFill>
                   <a:srgbClr val="FFFFFF"/>
                 </a:solidFill>
               </a14:hiddenFill>
             </a:ext>
             <a:ext uri="{91240B29-F687-4f45-9708-019B960494DF}">
-              <a14:hiddenLine xmlns:a14="http://schemas.microsoft.com/office/drawing/2010/main" xmlns="" w="9525">
+              <a14:hiddenLine xmlns="" xmlns:a14="http://schemas.microsoft.com/office/drawing/2010/main" w="9525">
                 <a:solidFill>
                   <a:srgbClr val="000000"/>
                 </a:solidFill>
@@ -13017,14 +13001,14 @@
           </a:ln>
           <a:extLst>
             <a:ext uri="{909E8E84-426E-40dd-AFC4-6F175D3DCCD1}">
-              <a14:hiddenFill xmlns:a14="http://schemas.microsoft.com/office/drawing/2010/main" xmlns="">
+              <a14:hiddenFill xmlns="" xmlns:a14="http://schemas.microsoft.com/office/drawing/2010/main">
                 <a:solidFill>
                   <a:srgbClr val="FFFFFF"/>
                 </a:solidFill>
               </a14:hiddenFill>
             </a:ext>
             <a:ext uri="{91240B29-F687-4f45-9708-019B960494DF}">
-              <a14:hiddenLine xmlns:a14="http://schemas.microsoft.com/office/drawing/2010/main" xmlns="" w="9525">
+              <a14:hiddenLine xmlns="" xmlns:a14="http://schemas.microsoft.com/office/drawing/2010/main" w="9525">
                 <a:solidFill>
                   <a:srgbClr val="000000"/>
                 </a:solidFill>
@@ -13964,14 +13948,14 @@
           </a:ln>
           <a:extLst>
             <a:ext uri="{909E8E84-426E-40dd-AFC4-6F175D3DCCD1}">
-              <a14:hiddenFill xmlns:a14="http://schemas.microsoft.com/office/drawing/2010/main" xmlns="">
+              <a14:hiddenFill xmlns="" xmlns:a14="http://schemas.microsoft.com/office/drawing/2010/main">
                 <a:solidFill>
                   <a:srgbClr val="FFFFFF"/>
                 </a:solidFill>
               </a14:hiddenFill>
             </a:ext>
             <a:ext uri="{91240B29-F687-4f45-9708-019B960494DF}">
-              <a14:hiddenLine xmlns:a14="http://schemas.microsoft.com/office/drawing/2010/main" xmlns="" w="9525">
+              <a14:hiddenLine xmlns="" xmlns:a14="http://schemas.microsoft.com/office/drawing/2010/main" w="9525">
                 <a:solidFill>
                   <a:srgbClr val="000000"/>
                 </a:solidFill>
@@ -14755,14 +14739,14 @@
           </a:ln>
           <a:extLst>
             <a:ext uri="{909E8E84-426E-40dd-AFC4-6F175D3DCCD1}">
-              <a14:hiddenFill xmlns:a14="http://schemas.microsoft.com/office/drawing/2010/main" xmlns="">
+              <a14:hiddenFill xmlns="" xmlns:a14="http://schemas.microsoft.com/office/drawing/2010/main">
                 <a:solidFill>
                   <a:srgbClr val="FFFFFF"/>
                 </a:solidFill>
               </a14:hiddenFill>
             </a:ext>
             <a:ext uri="{91240B29-F687-4f45-9708-019B960494DF}">
-              <a14:hiddenLine xmlns:a14="http://schemas.microsoft.com/office/drawing/2010/main" xmlns="" w="9525">
+              <a14:hiddenLine xmlns="" xmlns:a14="http://schemas.microsoft.com/office/drawing/2010/main" w="9525">
                 <a:solidFill>
                   <a:srgbClr val="000000"/>
                 </a:solidFill>
@@ -15716,11 +15700,15 @@
             </a:r>
             <a:r>
               <a:rPr lang="en-US" dirty="0" smtClean="0"/>
-              <a:t> test/smoke/default/</a:t>
+              <a:t> </a:t>
+            </a:r>
+            <a:r>
+              <a:rPr lang="en-US" dirty="0" smtClean="0"/>
+              <a:t>test/smoke/default/</a:t>
             </a:r>
             <a:r>
               <a:rPr lang="en-US" dirty="0" err="1" smtClean="0"/>
-              <a:t>install.rb</a:t>
+              <a:t>install_test.rb</a:t>
             </a:r>
             <a:r>
               <a:rPr lang="en-US" dirty="0" smtClean="0"/>
@@ -16313,15 +16301,7 @@
             </a:r>
             <a:r>
               <a:rPr lang="en-US" dirty="0" smtClean="0"/>
-              <a:t> </a:t>
-            </a:r>
-            <a:r>
-              <a:rPr lang="en-US" dirty="0" smtClean="0"/>
-              <a:t>'apache::</a:t>
-            </a:r>
-            <a:r>
-              <a:rPr lang="en-US" dirty="0" smtClean="0"/>
-              <a:t>install'</a:t>
+              <a:t> 'apache::install'</a:t>
             </a:r>
           </a:p>
           <a:p>
@@ -17042,11 +17022,7 @@
             </a:r>
             <a:r>
               <a:rPr lang="en-US" dirty="0" smtClean="0"/>
-              <a:t>home/chef/apache/test/smoke/default</a:t>
-            </a:r>
-            <a:r>
-              <a:rPr lang="en-US" dirty="0" smtClean="0"/>
-              <a:t>` </a:t>
+              <a:t>home/chef/apache/test/smoke/default` </a:t>
             </a:r>
             <a:r>
               <a:rPr lang="en-US" dirty="0"/>
@@ -18104,11 +18080,15 @@
             </a:r>
             <a:r>
               <a:rPr lang="en-US" dirty="0" smtClean="0"/>
-              <a:t> test/smoke/default/</a:t>
+              <a:t> </a:t>
+            </a:r>
+            <a:r>
+              <a:rPr lang="en-US" dirty="0" smtClean="0"/>
+              <a:t>test/smoke/default/</a:t>
             </a:r>
             <a:r>
               <a:rPr lang="en-US" dirty="0" err="1" smtClean="0"/>
-              <a:t>configuration.rb</a:t>
+              <a:t>configuration_test.rb</a:t>
             </a:r>
             <a:endParaRPr lang="en-US" dirty="0"/>
           </a:p>
@@ -18464,15 +18444,7 @@
             </a:r>
             <a:r>
               <a:rPr lang="en-US" dirty="0" smtClean="0"/>
-              <a:t> </a:t>
-            </a:r>
-            <a:r>
-              <a:rPr lang="en-US" dirty="0" smtClean="0"/>
-              <a:t>'apache::</a:t>
-            </a:r>
-            <a:r>
-              <a:rPr lang="en-US" dirty="0" smtClean="0"/>
-              <a:t>install'</a:t>
+              <a:t> 'apache::install'</a:t>
             </a:r>
           </a:p>
           <a:p>
@@ -18720,15 +18692,7 @@
             </a:r>
             <a:r>
               <a:rPr lang="en-US" dirty="0" smtClean="0"/>
-              <a:t> </a:t>
-            </a:r>
-            <a:r>
-              <a:rPr lang="en-US" dirty="0" smtClean="0"/>
-              <a:t>'apache::</a:t>
-            </a:r>
-            <a:r>
-              <a:rPr lang="en-US" dirty="0" smtClean="0"/>
-              <a:t>install'</a:t>
+              <a:t> 'apache::install'</a:t>
             </a:r>
           </a:p>
           <a:p>
@@ -18738,15 +18702,7 @@
             </a:r>
             <a:r>
               <a:rPr lang="en-US" dirty="0" smtClean="0"/>
-              <a:t> </a:t>
-            </a:r>
-            <a:r>
-              <a:rPr lang="en-US" dirty="0" smtClean="0"/>
-              <a:t>'apache::</a:t>
-            </a:r>
-            <a:r>
-              <a:rPr lang="en-US" dirty="0" smtClean="0"/>
-              <a:t>configuration'</a:t>
+              <a:t> 'apache::configuration'</a:t>
             </a:r>
             <a:endParaRPr lang="en-US" dirty="0"/>
           </a:p>
@@ -19144,11 +19100,7 @@
             </a:r>
             <a:r>
               <a:rPr lang="en-US" dirty="0" smtClean="0"/>
-              <a:t>home/chef/apache/test/smoke/default</a:t>
-            </a:r>
-            <a:r>
-              <a:rPr lang="en-US" dirty="0" smtClean="0"/>
-              <a:t>` </a:t>
+              <a:t>home/chef/apache/test/smoke/default` </a:t>
             </a:r>
             <a:r>
               <a:rPr lang="en-US" dirty="0"/>
@@ -20152,11 +20104,15 @@
             </a:r>
             <a:r>
               <a:rPr lang="en-US" dirty="0" smtClean="0"/>
-              <a:t> test/smoke/default/</a:t>
+              <a:t> </a:t>
+            </a:r>
+            <a:r>
+              <a:rPr lang="en-US" dirty="0" smtClean="0"/>
+              <a:t>test/smoke/default/</a:t>
             </a:r>
             <a:r>
               <a:rPr lang="en-US" dirty="0" err="1" smtClean="0"/>
-              <a:t>service.rb</a:t>
+              <a:t>service_test.rb</a:t>
             </a:r>
             <a:endParaRPr lang="en-US" dirty="0"/>
           </a:p>
@@ -20673,15 +20629,7 @@
             </a:r>
             <a:r>
               <a:rPr lang="en-US" dirty="0" smtClean="0"/>
-              <a:t> </a:t>
-            </a:r>
-            <a:r>
-              <a:rPr lang="en-US" dirty="0" smtClean="0"/>
-              <a:t>'apache::</a:t>
-            </a:r>
-            <a:r>
-              <a:rPr lang="en-US" dirty="0" smtClean="0"/>
-              <a:t>install'</a:t>
+              <a:t> 'apache::install'</a:t>
             </a:r>
           </a:p>
           <a:p>
@@ -20691,15 +20639,7 @@
             </a:r>
             <a:r>
               <a:rPr lang="en-US" dirty="0" smtClean="0"/>
-              <a:t> </a:t>
-            </a:r>
-            <a:r>
-              <a:rPr lang="en-US" dirty="0" smtClean="0"/>
-              <a:t>'apache::</a:t>
-            </a:r>
-            <a:r>
-              <a:rPr lang="en-US" dirty="0" smtClean="0"/>
-              <a:t>configuration'</a:t>
+              <a:t> 'apache::configuration'</a:t>
             </a:r>
             <a:endParaRPr lang="en-US" dirty="0"/>
           </a:p>
@@ -20911,15 +20851,7 @@
             </a:r>
             <a:r>
               <a:rPr lang="en-US" dirty="0" smtClean="0"/>
-              <a:t> </a:t>
-            </a:r>
-            <a:r>
-              <a:rPr lang="en-US" dirty="0" smtClean="0"/>
-              <a:t>'apache::</a:t>
-            </a:r>
-            <a:r>
-              <a:rPr lang="en-US" dirty="0" smtClean="0"/>
-              <a:t>install'</a:t>
+              <a:t> 'apache::install'</a:t>
             </a:r>
           </a:p>
           <a:p>
@@ -20929,15 +20861,7 @@
             </a:r>
             <a:r>
               <a:rPr lang="en-US" dirty="0" smtClean="0"/>
-              <a:t> </a:t>
-            </a:r>
-            <a:r>
-              <a:rPr lang="en-US" dirty="0" smtClean="0"/>
-              <a:t>'apache::</a:t>
-            </a:r>
-            <a:r>
-              <a:rPr lang="en-US" dirty="0" smtClean="0"/>
-              <a:t>configuration'</a:t>
+              <a:t> 'apache::configuration'</a:t>
             </a:r>
             <a:endParaRPr lang="en-US" dirty="0"/>
           </a:p>
@@ -20948,15 +20872,7 @@
             </a:r>
             <a:r>
               <a:rPr lang="en-US" dirty="0" smtClean="0"/>
-              <a:t> </a:t>
-            </a:r>
-            <a:r>
-              <a:rPr lang="en-US" dirty="0" smtClean="0"/>
-              <a:t>'apache::</a:t>
-            </a:r>
-            <a:r>
-              <a:rPr lang="en-US" dirty="0" smtClean="0"/>
-              <a:t>service'</a:t>
+              <a:t> 'apache::service'</a:t>
             </a:r>
             <a:endParaRPr lang="en-US" dirty="0"/>
           </a:p>
@@ -21322,11 +21238,7 @@
             </a:r>
             <a:r>
               <a:rPr lang="en-US" dirty="0" smtClean="0"/>
-              <a:t>home/chef/apache/test/smoke/default</a:t>
-            </a:r>
-            <a:r>
-              <a:rPr lang="en-US" dirty="0" smtClean="0"/>
-              <a:t>` </a:t>
+              <a:t>home/chef/apache/test/smoke/default` </a:t>
             </a:r>
             <a:r>
               <a:rPr lang="en-US" dirty="0"/>
@@ -22223,11 +22135,7 @@
             </a:r>
             <a:r>
               <a:rPr lang="en-US" dirty="0" smtClean="0"/>
-              <a:t> </a:t>
-            </a:r>
-            <a:r>
-              <a:rPr lang="en-US" dirty="0" smtClean="0"/>
-              <a:t>'apache::</a:t>
+              <a:t> 'apache::</a:t>
             </a:r>
             <a:r>
               <a:rPr lang="en-US" dirty="0"/>
@@ -22245,15 +22153,7 @@
             </a:r>
             <a:r>
               <a:rPr lang="en-US" dirty="0" smtClean="0"/>
-              <a:t> </a:t>
-            </a:r>
-            <a:r>
-              <a:rPr lang="en-US" dirty="0" smtClean="0"/>
-              <a:t>'apache::</a:t>
-            </a:r>
-            <a:r>
-              <a:rPr lang="en-US" dirty="0" smtClean="0"/>
-              <a:t>configuration</a:t>
+              <a:t> 'apache::configuration</a:t>
             </a:r>
             <a:endParaRPr lang="en-US" dirty="0"/>
           </a:p>
@@ -22264,11 +22164,7 @@
             </a:r>
             <a:r>
               <a:rPr lang="en-US" dirty="0" smtClean="0"/>
-              <a:t> </a:t>
-            </a:r>
-            <a:r>
-              <a:rPr lang="en-US" dirty="0" smtClean="0"/>
-              <a:t>'apache::</a:t>
+              <a:t> 'apache::</a:t>
             </a:r>
             <a:r>
               <a:rPr lang="en-US" dirty="0"/>
@@ -23819,11 +23715,7 @@
             </a:r>
             <a:r>
               <a:rPr lang="en-US" dirty="0" smtClean="0"/>
-              <a:t>apache::</a:t>
-            </a:r>
-            <a:r>
-              <a:rPr lang="en-US" dirty="0" smtClean="0"/>
-              <a:t>configuration</a:t>
+              <a:t>apache::configuration</a:t>
             </a:r>
           </a:p>
           <a:p>
@@ -23851,11 +23743,7 @@
             </a:r>
             <a:r>
               <a:rPr lang="en-US" dirty="0" smtClean="0"/>
-              <a:t>apache::</a:t>
-            </a:r>
-            <a:r>
-              <a:rPr lang="en-US" dirty="0" smtClean="0"/>
-              <a:t>service</a:t>
+              <a:t>apache::service</a:t>
             </a:r>
           </a:p>
           <a:p>
@@ -24039,11 +23927,7 @@
             </a:r>
             <a:r>
               <a:rPr lang="en-US" dirty="0" smtClean="0"/>
-              <a:t>home/chef/apache/test/smoke/default</a:t>
-            </a:r>
-            <a:r>
-              <a:rPr lang="en-US" dirty="0" smtClean="0"/>
-              <a:t>` </a:t>
+              <a:t>home/chef/apache/test/smoke/default` </a:t>
             </a:r>
             <a:r>
               <a:rPr lang="en-US" dirty="0"/>

</xml_diff>

<commit_message>
added link 4.5, changed centos 6.7 to 6.9, corrected test file names to include _test.rb
</commit_message>
<xml_diff>
--- a/04-refactoring_cookbooks_with_tests.pptx
+++ b/04-refactoring_cookbooks_with_tests.pptx
@@ -8333,14 +8333,14 @@
           </a:ln>
           <a:extLst>
             <a:ext uri="{909E8E84-426E-40dd-AFC4-6F175D3DCCD1}">
-              <a14:hiddenFill xmlns="" xmlns:a14="http://schemas.microsoft.com/office/drawing/2010/main">
+              <a14:hiddenFill xmlns:a14="http://schemas.microsoft.com/office/drawing/2010/main" xmlns="">
                 <a:solidFill>
                   <a:srgbClr val="FFFFFF"/>
                 </a:solidFill>
               </a14:hiddenFill>
             </a:ext>
             <a:ext uri="{91240B29-F687-4f45-9708-019B960494DF}">
-              <a14:hiddenLine xmlns="" xmlns:a14="http://schemas.microsoft.com/office/drawing/2010/main" w="9525">
+              <a14:hiddenLine xmlns:a14="http://schemas.microsoft.com/office/drawing/2010/main" xmlns="" w="9525">
                 <a:solidFill>
                   <a:srgbClr val="000000"/>
                 </a:solidFill>
@@ -8488,14 +8488,14 @@
           </a:ln>
           <a:extLst>
             <a:ext uri="{909E8E84-426E-40dd-AFC4-6F175D3DCCD1}">
-              <a14:hiddenFill xmlns="" xmlns:a14="http://schemas.microsoft.com/office/drawing/2010/main">
+              <a14:hiddenFill xmlns:a14="http://schemas.microsoft.com/office/drawing/2010/main" xmlns="">
                 <a:solidFill>
                   <a:srgbClr val="FFFFFF"/>
                 </a:solidFill>
               </a14:hiddenFill>
             </a:ext>
             <a:ext uri="{91240B29-F687-4f45-9708-019B960494DF}">
-              <a14:hiddenLine xmlns="" xmlns:a14="http://schemas.microsoft.com/office/drawing/2010/main" w="9525">
+              <a14:hiddenLine xmlns:a14="http://schemas.microsoft.com/office/drawing/2010/main" xmlns="" w="9525">
                 <a:solidFill>
                   <a:srgbClr val="000000"/>
                 </a:solidFill>
@@ -8986,14 +8986,14 @@
           </a:ln>
           <a:extLst>
             <a:ext uri="{909E8E84-426E-40dd-AFC4-6F175D3DCCD1}">
-              <a14:hiddenFill xmlns="" xmlns:a14="http://schemas.microsoft.com/office/drawing/2010/main">
+              <a14:hiddenFill xmlns:a14="http://schemas.microsoft.com/office/drawing/2010/main" xmlns="">
                 <a:solidFill>
                   <a:srgbClr val="FFFFFF"/>
                 </a:solidFill>
               </a14:hiddenFill>
             </a:ext>
             <a:ext uri="{91240B29-F687-4f45-9708-019B960494DF}">
-              <a14:hiddenLine xmlns="" xmlns:a14="http://schemas.microsoft.com/office/drawing/2010/main" w="9525">
+              <a14:hiddenLine xmlns:a14="http://schemas.microsoft.com/office/drawing/2010/main" xmlns="" w="9525">
                 <a:solidFill>
                   <a:srgbClr val="000000"/>
                 </a:solidFill>
@@ -10420,14 +10420,14 @@
           </a:ln>
           <a:extLst>
             <a:ext uri="{909E8E84-426E-40dd-AFC4-6F175D3DCCD1}">
-              <a14:hiddenFill xmlns="" xmlns:a14="http://schemas.microsoft.com/office/drawing/2010/main">
+              <a14:hiddenFill xmlns:a14="http://schemas.microsoft.com/office/drawing/2010/main" xmlns="">
                 <a:solidFill>
                   <a:srgbClr val="FFFFFF"/>
                 </a:solidFill>
               </a14:hiddenFill>
             </a:ext>
             <a:ext uri="{91240B29-F687-4f45-9708-019B960494DF}">
-              <a14:hiddenLine xmlns="" xmlns:a14="http://schemas.microsoft.com/office/drawing/2010/main" w="9525">
+              <a14:hiddenLine xmlns:a14="http://schemas.microsoft.com/office/drawing/2010/main" xmlns="" w="9525">
                 <a:solidFill>
                   <a:srgbClr val="000000"/>
                 </a:solidFill>
@@ -11761,14 +11761,14 @@
           </a:ln>
           <a:extLst>
             <a:ext uri="{909E8E84-426E-40dd-AFC4-6F175D3DCCD1}">
-              <a14:hiddenFill xmlns="" xmlns:a14="http://schemas.microsoft.com/office/drawing/2010/main">
+              <a14:hiddenFill xmlns:a14="http://schemas.microsoft.com/office/drawing/2010/main" xmlns="">
                 <a:solidFill>
                   <a:srgbClr val="FFFFFF"/>
                 </a:solidFill>
               </a14:hiddenFill>
             </a:ext>
             <a:ext uri="{91240B29-F687-4f45-9708-019B960494DF}">
-              <a14:hiddenLine xmlns="" xmlns:a14="http://schemas.microsoft.com/office/drawing/2010/main" w="9525">
+              <a14:hiddenLine xmlns:a14="http://schemas.microsoft.com/office/drawing/2010/main" xmlns="" w="9525">
                 <a:solidFill>
                   <a:srgbClr val="000000"/>
                 </a:solidFill>
@@ -12326,14 +12326,14 @@
           </a:ln>
           <a:extLst>
             <a:ext uri="{909E8E84-426E-40dd-AFC4-6F175D3DCCD1}">
-              <a14:hiddenFill xmlns="" xmlns:a14="http://schemas.microsoft.com/office/drawing/2010/main">
+              <a14:hiddenFill xmlns:a14="http://schemas.microsoft.com/office/drawing/2010/main" xmlns="">
                 <a:solidFill>
                   <a:srgbClr val="FFFFFF"/>
                 </a:solidFill>
               </a14:hiddenFill>
             </a:ext>
             <a:ext uri="{91240B29-F687-4f45-9708-019B960494DF}">
-              <a14:hiddenLine xmlns="" xmlns:a14="http://schemas.microsoft.com/office/drawing/2010/main" w="9525">
+              <a14:hiddenLine xmlns:a14="http://schemas.microsoft.com/office/drawing/2010/main" xmlns="" w="9525">
                 <a:solidFill>
                   <a:srgbClr val="000000"/>
                 </a:solidFill>
@@ -12900,14 +12900,14 @@
           </a:ln>
           <a:extLst>
             <a:ext uri="{909E8E84-426E-40dd-AFC4-6F175D3DCCD1}">
-              <a14:hiddenFill xmlns="" xmlns:a14="http://schemas.microsoft.com/office/drawing/2010/main">
+              <a14:hiddenFill xmlns:a14="http://schemas.microsoft.com/office/drawing/2010/main" xmlns="">
                 <a:solidFill>
                   <a:srgbClr val="FFFFFF"/>
                 </a:solidFill>
               </a14:hiddenFill>
             </a:ext>
             <a:ext uri="{91240B29-F687-4f45-9708-019B960494DF}">
-              <a14:hiddenLine xmlns="" xmlns:a14="http://schemas.microsoft.com/office/drawing/2010/main" w="9525">
+              <a14:hiddenLine xmlns:a14="http://schemas.microsoft.com/office/drawing/2010/main" xmlns="" w="9525">
                 <a:solidFill>
                   <a:srgbClr val="000000"/>
                 </a:solidFill>
@@ -13847,14 +13847,14 @@
           </a:ln>
           <a:extLst>
             <a:ext uri="{909E8E84-426E-40dd-AFC4-6F175D3DCCD1}">
-              <a14:hiddenFill xmlns="" xmlns:a14="http://schemas.microsoft.com/office/drawing/2010/main">
+              <a14:hiddenFill xmlns:a14="http://schemas.microsoft.com/office/drawing/2010/main" xmlns="">
                 <a:solidFill>
                   <a:srgbClr val="FFFFFF"/>
                 </a:solidFill>
               </a14:hiddenFill>
             </a:ext>
             <a:ext uri="{91240B29-F687-4f45-9708-019B960494DF}">
-              <a14:hiddenLine xmlns="" xmlns:a14="http://schemas.microsoft.com/office/drawing/2010/main" w="9525">
+              <a14:hiddenLine xmlns:a14="http://schemas.microsoft.com/office/drawing/2010/main" xmlns="" w="9525">
                 <a:solidFill>
                   <a:srgbClr val="000000"/>
                 </a:solidFill>
@@ -14609,14 +14609,14 @@
           </a:ln>
           <a:extLst>
             <a:ext uri="{909E8E84-426E-40dd-AFC4-6F175D3DCCD1}">
-              <a14:hiddenFill xmlns="" xmlns:a14="http://schemas.microsoft.com/office/drawing/2010/main">
+              <a14:hiddenFill xmlns:a14="http://schemas.microsoft.com/office/drawing/2010/main" xmlns="">
                 <a:solidFill>
                   <a:srgbClr val="FFFFFF"/>
                 </a:solidFill>
               </a14:hiddenFill>
             </a:ext>
             <a:ext uri="{91240B29-F687-4f45-9708-019B960494DF}">
-              <a14:hiddenLine xmlns="" xmlns:a14="http://schemas.microsoft.com/office/drawing/2010/main" w="9525">
+              <a14:hiddenLine xmlns:a14="http://schemas.microsoft.com/office/drawing/2010/main" xmlns="" w="9525">
                 <a:solidFill>
                   <a:srgbClr val="000000"/>
                 </a:solidFill>
@@ -15536,12 +15536,8 @@
               <a:t> test/smoke/default/</a:t>
             </a:r>
             <a:r>
-              <a:rPr lang="en-US"/>
-              <a:t>install_test.</a:t>
-            </a:r>
-            <a:r>
               <a:rPr lang="en-US" dirty="0" err="1"/>
-              <a:t>rb</a:t>
+              <a:t>install_test.rb</a:t>
             </a:r>
             <a:r>
               <a:rPr lang="en-US" dirty="0"/>
@@ -16543,7 +16539,7 @@
           <a:p>
             <a:r>
               <a:rPr lang="en-US" dirty="0"/>
-              <a:t>-----&gt; Converging &lt;default-centos-67&gt;...</a:t>
+              <a:t>-----&gt; Converging &lt;default-centos-69&gt;...</a:t>
             </a:r>
           </a:p>
           <a:p>
@@ -16609,7 +16605,7 @@
           <a:p>
             <a:r>
               <a:rPr lang="en-US" dirty="0"/>
-              <a:t>       Finished converging &lt;default-centos-67&gt; (0m27.64s).</a:t>
+              <a:t>       Finished converging &lt;default-centos-69&gt; (0m27.64s).</a:t>
             </a:r>
           </a:p>
           <a:p>
@@ -16720,7 +16716,7 @@
           <a:p>
             <a:r>
               <a:rPr lang="en-US" dirty="0"/>
-              <a:t>-----&gt; Verifying &lt;default-centos-67&gt;...</a:t>
+              <a:t>-----&gt; Verifying &lt;default-centos-69&gt;...</a:t>
             </a:r>
           </a:p>
           <a:p>
@@ -17662,7 +17658,7 @@
             </a:r>
             <a:r>
               <a:rPr lang="en-US" dirty="0" err="1"/>
-              <a:t>configuration.rb</a:t>
+              <a:t>configuration_test.rb</a:t>
             </a:r>
             <a:endParaRPr lang="en-US" dirty="0"/>
           </a:p>
@@ -18383,7 +18379,7 @@
           <a:p>
             <a:r>
               <a:rPr lang="en-US" dirty="0"/>
-              <a:t>-----&gt; Converging &lt;default-centos-67&gt;...</a:t>
+              <a:t>-----&gt; Converging &lt;default-centos-69&gt;...</a:t>
             </a:r>
           </a:p>
           <a:p>
@@ -18449,7 +18445,7 @@
           <a:p>
             <a:r>
               <a:rPr lang="en-US" dirty="0"/>
-              <a:t>       Finished converging &lt;default-centos-67&gt; (0m27.64s).</a:t>
+              <a:t>       Finished converging &lt;default-centos-69&gt; (0m27.64s).</a:t>
             </a:r>
           </a:p>
           <a:p>
@@ -18560,7 +18556,7 @@
           <a:p>
             <a:r>
               <a:rPr lang="en-US" dirty="0"/>
-              <a:t>-----&gt; Verifying &lt;default-centos-67&gt;...</a:t>
+              <a:t>-----&gt; Verifying &lt;default-centos-69&gt;...</a:t>
             </a:r>
           </a:p>
           <a:p>
@@ -19446,7 +19442,7 @@
             </a:r>
             <a:r>
               <a:rPr lang="en-US" dirty="0" err="1"/>
-              <a:t>service.rb</a:t>
+              <a:t>service_test.rb</a:t>
             </a:r>
             <a:endParaRPr lang="en-US" dirty="0"/>
           </a:p>
@@ -20266,7 +20262,7 @@
           <a:p>
             <a:r>
               <a:rPr lang="en-US" dirty="0"/>
-              <a:t>-----&gt; Converging &lt;default-centos-67&gt;...</a:t>
+              <a:t>-----&gt; Converging &lt;default-centos-69&gt;...</a:t>
             </a:r>
           </a:p>
           <a:p>
@@ -20332,7 +20328,7 @@
           <a:p>
             <a:r>
               <a:rPr lang="en-US" dirty="0"/>
-              <a:t>       Finished converging &lt;default-centos-67&gt; (0m27.64s).</a:t>
+              <a:t>       Finished converging &lt;default-centos-69&gt; (0m27.64s).</a:t>
             </a:r>
           </a:p>
           <a:p>
@@ -20443,7 +20439,7 @@
           <a:p>
             <a:r>
               <a:rPr lang="en-US" dirty="0"/>
-              <a:t>-----&gt; Verifying &lt;default-centos-67&gt;...</a:t>
+              <a:t>-----&gt; Verifying &lt;default-centos-69&gt;...</a:t>
             </a:r>
           </a:p>
           <a:p>
@@ -22752,7 +22748,7 @@
           <a:p>
             <a:r>
               <a:rPr lang="en-US" dirty="0"/>
-              <a:t>-----&gt; Converging &lt;default-centos-67&gt;...</a:t>
+              <a:t>-----&gt; Converging &lt;default-centos-69&gt;...</a:t>
             </a:r>
           </a:p>
           <a:p>
@@ -22935,7 +22931,7 @@
           <a:p>
             <a:r>
               <a:rPr lang="en-US" dirty="0"/>
-              <a:t>-----&gt; Verifying &lt;default-centos-67&gt;...</a:t>
+              <a:t>-----&gt; Verifying &lt;default-centos-69&gt;...</a:t>
             </a:r>
           </a:p>
           <a:p>
@@ -25884,13 +25880,13 @@
           <a:p>
             <a:r>
               <a:rPr lang="en-US" dirty="0"/>
-              <a:t>-----&gt; Cleaning up any prior instances of &lt;default-centos-67&gt;</a:t>
-            </a:r>
-          </a:p>
-          <a:p>
-            <a:r>
-              <a:rPr lang="en-US" dirty="0"/>
-              <a:t>-----&gt; Destroying &lt;default-centos-67&gt;...</a:t>
+              <a:t>-----&gt; Cleaning up any prior instances of &lt;default-centos-69&gt;</a:t>
+            </a:r>
+          </a:p>
+          <a:p>
+            <a:r>
+              <a:rPr lang="en-US" dirty="0"/>
+              <a:t>-----&gt; Destroying &lt;default-centos-69&gt;...</a:t>
             </a:r>
           </a:p>
           <a:p>
@@ -25947,7 +25943,7 @@
           <a:p>
             <a:r>
               <a:rPr lang="en-US" dirty="0"/>
-              <a:t>&gt;&gt;&gt;&gt;&gt;&gt;     Converge failed on instance &lt;default-centos-67&gt;.  </a:t>
+              <a:t>&gt;&gt;&gt;&gt;&gt;&gt;     Converge failed on instance &lt;default-centos-69&gt;.  </a:t>
             </a:r>
           </a:p>
         </p:txBody>
@@ -29788,15 +29784,6 @@
 
 <file path=customXml/item1.xml><?xml version="1.0" encoding="utf-8"?>
 <?mso-contentType ?>
-<FormTemplates xmlns="http://schemas.microsoft.com/sharepoint/v3/contenttype/forms">
-  <Display>DocumentLibraryForm</Display>
-  <Edit>DocumentLibraryForm</Edit>
-  <New>DocumentLibraryForm</New>
-</FormTemplates>
-</file>
-
-<file path=customXml/item2.xml><?xml version="1.0" encoding="utf-8"?>
-<?mso-contentType ?>
 <spe:Receivers xmlns:spe="http://schemas.microsoft.com/sharepoint/events">
   <Receiver>
     <Name>Document ID Generator</Name>
@@ -29841,7 +29828,28 @@
 </spe:Receivers>
 </file>
 
+<file path=customXml/item2.xml><?xml version="1.0" encoding="utf-8"?>
+<?mso-contentType ?>
+<FormTemplates xmlns="http://schemas.microsoft.com/sharepoint/v3/contenttype/forms">
+  <Display>DocumentLibraryForm</Display>
+  <Edit>DocumentLibraryForm</Edit>
+  <New>DocumentLibraryForm</New>
+</FormTemplates>
+</file>
+
 <file path=customXml/item3.xml><?xml version="1.0" encoding="utf-8"?>
+<p:properties xmlns:p="http://schemas.microsoft.com/office/2006/metadata/properties" xmlns:xsi="http://www.w3.org/2001/XMLSchema-instance" xmlns:pc="http://schemas.microsoft.com/office/infopath/2007/PartnerControls">
+  <documentManagement>
+    <_dlc_DocId xmlns="7bb5d761-a2ea-4873-95f7-7a6658fb3ef0">M4CWTKMW727E-592-73</_dlc_DocId>
+    <_dlc_DocIdUrl xmlns="7bb5d761-a2ea-4873-95f7-7a6658fb3ef0">
+      <Url>https://kms.vci.local/marketing/team/_layouts/DocIdRedir.aspx?ID=M4CWTKMW727E-592-73</Url>
+      <Description>M4CWTKMW727E-592-73</Description>
+    </_dlc_DocIdUrl>
+  </documentManagement>
+</p:properties>
+</file>
+
+<file path=customXml/item4.xml><?xml version="1.0" encoding="utf-8"?>
 <ct:contentTypeSchema xmlns:ct="http://schemas.microsoft.com/office/2006/metadata/contentType" xmlns:ma="http://schemas.microsoft.com/office/2006/metadata/properties/metaAttributes" ct:_="" ma:_="" ma:contentTypeName="Document" ma:contentTypeID="0x0101000812F700BE7F874999720E88173FE491" ma:contentTypeVersion="0" ma:contentTypeDescription="Create a new document." ma:contentTypeScope="" ma:versionID="3f79f408e2ca720b7aba6e0e32464d0c">
   <xsd:schema xmlns:xsd="http://www.w3.org/2001/XMLSchema" xmlns:xs="http://www.w3.org/2001/XMLSchema" xmlns:p="http://schemas.microsoft.com/office/2006/metadata/properties" xmlns:ns2="7bb5d761-a2ea-4873-95f7-7a6658fb3ef0" targetNamespace="http://schemas.microsoft.com/office/2006/metadata/properties" ma:root="true" ma:fieldsID="1e062cd38ba31e406bfc4340fbc7f87a" ns2:_="">
     <xsd:import namespace="7bb5d761-a2ea-4873-95f7-7a6658fb3ef0"/>
@@ -29986,19 +29994,15 @@
 </ct:contentTypeSchema>
 </file>
 
-<file path=customXml/item4.xml><?xml version="1.0" encoding="utf-8"?>
-<p:properties xmlns:p="http://schemas.microsoft.com/office/2006/metadata/properties" xmlns:xsi="http://www.w3.org/2001/XMLSchema-instance" xmlns:pc="http://schemas.microsoft.com/office/infopath/2007/PartnerControls">
-  <documentManagement>
-    <_dlc_DocId xmlns="7bb5d761-a2ea-4873-95f7-7a6658fb3ef0">M4CWTKMW727E-592-73</_dlc_DocId>
-    <_dlc_DocIdUrl xmlns="7bb5d761-a2ea-4873-95f7-7a6658fb3ef0">
-      <Url>https://kms.vci.local/marketing/team/_layouts/DocIdRedir.aspx?ID=M4CWTKMW727E-592-73</Url>
-      <Description>M4CWTKMW727E-592-73</Description>
-    </_dlc_DocIdUrl>
-  </documentManagement>
-</p:properties>
+<file path=customXml/itemProps1.xml><?xml version="1.0" encoding="utf-8"?>
+<ds:datastoreItem xmlns:ds="http://schemas.openxmlformats.org/officeDocument/2006/customXml" ds:itemID="{B13EBC30-FE27-4C6A-B723-23FC2188F7DC}">
+  <ds:schemaRefs>
+    <ds:schemaRef ds:uri="http://schemas.microsoft.com/sharepoint/events"/>
+  </ds:schemaRefs>
+</ds:datastoreItem>
 </file>
 
-<file path=customXml/itemProps1.xml><?xml version="1.0" encoding="utf-8"?>
+<file path=customXml/itemProps2.xml><?xml version="1.0" encoding="utf-8"?>
 <ds:datastoreItem xmlns:ds="http://schemas.openxmlformats.org/officeDocument/2006/customXml" ds:itemID="{5CDEB364-43EC-4510-9881-539C2A3FCE9E}">
   <ds:schemaRefs>
     <ds:schemaRef ds:uri="http://schemas.microsoft.com/sharepoint/v3/contenttype/forms"/>
@@ -30006,15 +30010,23 @@
 </ds:datastoreItem>
 </file>
 
-<file path=customXml/itemProps2.xml><?xml version="1.0" encoding="utf-8"?>
-<ds:datastoreItem xmlns:ds="http://schemas.openxmlformats.org/officeDocument/2006/customXml" ds:itemID="{B13EBC30-FE27-4C6A-B723-23FC2188F7DC}">
+<file path=customXml/itemProps3.xml><?xml version="1.0" encoding="utf-8"?>
+<ds:datastoreItem xmlns:ds="http://schemas.openxmlformats.org/officeDocument/2006/customXml" ds:itemID="{6921749B-AEB7-461B-845F-603CABD25259}">
   <ds:schemaRefs>
-    <ds:schemaRef ds:uri="http://schemas.microsoft.com/sharepoint/events"/>
+    <ds:schemaRef ds:uri="7bb5d761-a2ea-4873-95f7-7a6658fb3ef0"/>
+    <ds:schemaRef ds:uri="http://purl.org/dc/terms/"/>
+    <ds:schemaRef ds:uri="http://schemas.openxmlformats.org/package/2006/metadata/core-properties"/>
+    <ds:schemaRef ds:uri="http://purl.org/dc/dcmitype/"/>
+    <ds:schemaRef ds:uri="http://schemas.microsoft.com/office/2006/documentManagement/types"/>
+    <ds:schemaRef ds:uri="http://purl.org/dc/elements/1.1/"/>
+    <ds:schemaRef ds:uri="http://schemas.microsoft.com/office/2006/metadata/properties"/>
+    <ds:schemaRef ds:uri="http://schemas.microsoft.com/office/infopath/2007/PartnerControls"/>
+    <ds:schemaRef ds:uri="http://www.w3.org/XML/1998/namespace"/>
   </ds:schemaRefs>
 </ds:datastoreItem>
 </file>
 
-<file path=customXml/itemProps3.xml><?xml version="1.0" encoding="utf-8"?>
+<file path=customXml/itemProps4.xml><?xml version="1.0" encoding="utf-8"?>
 <ds:datastoreItem xmlns:ds="http://schemas.openxmlformats.org/officeDocument/2006/customXml" ds:itemID="{164479E5-0B02-49AC-B79E-EC1D6164DDD3}">
   <ds:schemaRefs>
     <ds:schemaRef ds:uri="http://schemas.microsoft.com/office/2006/metadata/contentType"/>
@@ -30030,20 +30042,4 @@
     <ds:schemaRef ds:uri="http://schemas.microsoft.com/internal/obd"/>
   </ds:schemaRefs>
 </ds:datastoreItem>
-</file>
-
-<file path=customXml/itemProps4.xml><?xml version="1.0" encoding="utf-8"?>
-<ds:datastoreItem xmlns:ds="http://schemas.openxmlformats.org/officeDocument/2006/customXml" ds:itemID="{6921749B-AEB7-461B-845F-603CABD25259}">
-  <ds:schemaRefs>
-    <ds:schemaRef ds:uri="7bb5d761-a2ea-4873-95f7-7a6658fb3ef0"/>
-    <ds:schemaRef ds:uri="http://purl.org/dc/terms/"/>
-    <ds:schemaRef ds:uri="http://schemas.openxmlformats.org/package/2006/metadata/core-properties"/>
-    <ds:schemaRef ds:uri="http://purl.org/dc/dcmitype/"/>
-    <ds:schemaRef ds:uri="http://schemas.microsoft.com/office/2006/documentManagement/types"/>
-    <ds:schemaRef ds:uri="http://purl.org/dc/elements/1.1/"/>
-    <ds:schemaRef ds:uri="http://schemas.microsoft.com/office/2006/metadata/properties"/>
-    <ds:schemaRef ds:uri="http://schemas.microsoft.com/office/infopath/2007/PartnerControls"/>
-    <ds:schemaRef ds:uri="http://www.w3.org/XML/1998/namespace"/>
-  </ds:schemaRefs>
-</ds:datastoreItem>
 </file>
</xml_diff>

<commit_message>
Mod 4: regenerated PDFs, updated screenshots
</commit_message>
<xml_diff>
--- a/04-refactoring_cookbooks_with_tests.pptx
+++ b/04-refactoring_cookbooks_with_tests.pptx
@@ -8333,14 +8333,14 @@
           </a:ln>
           <a:extLst>
             <a:ext uri="{909E8E84-426E-40dd-AFC4-6F175D3DCCD1}">
-              <a14:hiddenFill xmlns:a14="http://schemas.microsoft.com/office/drawing/2010/main" xmlns="">
+              <a14:hiddenFill xmlns="" xmlns:a14="http://schemas.microsoft.com/office/drawing/2010/main">
                 <a:solidFill>
                   <a:srgbClr val="FFFFFF"/>
                 </a:solidFill>
               </a14:hiddenFill>
             </a:ext>
             <a:ext uri="{91240B29-F687-4f45-9708-019B960494DF}">
-              <a14:hiddenLine xmlns:a14="http://schemas.microsoft.com/office/drawing/2010/main" xmlns="" w="9525">
+              <a14:hiddenLine xmlns="" xmlns:a14="http://schemas.microsoft.com/office/drawing/2010/main" w="9525">
                 <a:solidFill>
                   <a:srgbClr val="000000"/>
                 </a:solidFill>
@@ -8488,14 +8488,14 @@
           </a:ln>
           <a:extLst>
             <a:ext uri="{909E8E84-426E-40dd-AFC4-6F175D3DCCD1}">
-              <a14:hiddenFill xmlns:a14="http://schemas.microsoft.com/office/drawing/2010/main" xmlns="">
+              <a14:hiddenFill xmlns="" xmlns:a14="http://schemas.microsoft.com/office/drawing/2010/main">
                 <a:solidFill>
                   <a:srgbClr val="FFFFFF"/>
                 </a:solidFill>
               </a14:hiddenFill>
             </a:ext>
             <a:ext uri="{91240B29-F687-4f45-9708-019B960494DF}">
-              <a14:hiddenLine xmlns:a14="http://schemas.microsoft.com/office/drawing/2010/main" xmlns="" w="9525">
+              <a14:hiddenLine xmlns="" xmlns:a14="http://schemas.microsoft.com/office/drawing/2010/main" w="9525">
                 <a:solidFill>
                   <a:srgbClr val="000000"/>
                 </a:solidFill>
@@ -8986,14 +8986,14 @@
           </a:ln>
           <a:extLst>
             <a:ext uri="{909E8E84-426E-40dd-AFC4-6F175D3DCCD1}">
-              <a14:hiddenFill xmlns:a14="http://schemas.microsoft.com/office/drawing/2010/main" xmlns="">
+              <a14:hiddenFill xmlns="" xmlns:a14="http://schemas.microsoft.com/office/drawing/2010/main">
                 <a:solidFill>
                   <a:srgbClr val="FFFFFF"/>
                 </a:solidFill>
               </a14:hiddenFill>
             </a:ext>
             <a:ext uri="{91240B29-F687-4f45-9708-019B960494DF}">
-              <a14:hiddenLine xmlns:a14="http://schemas.microsoft.com/office/drawing/2010/main" xmlns="" w="9525">
+              <a14:hiddenLine xmlns="" xmlns:a14="http://schemas.microsoft.com/office/drawing/2010/main" w="9525">
                 <a:solidFill>
                   <a:srgbClr val="000000"/>
                 </a:solidFill>
@@ -10420,14 +10420,14 @@
           </a:ln>
           <a:extLst>
             <a:ext uri="{909E8E84-426E-40dd-AFC4-6F175D3DCCD1}">
-              <a14:hiddenFill xmlns:a14="http://schemas.microsoft.com/office/drawing/2010/main" xmlns="">
+              <a14:hiddenFill xmlns="" xmlns:a14="http://schemas.microsoft.com/office/drawing/2010/main">
                 <a:solidFill>
                   <a:srgbClr val="FFFFFF"/>
                 </a:solidFill>
               </a14:hiddenFill>
             </a:ext>
             <a:ext uri="{91240B29-F687-4f45-9708-019B960494DF}">
-              <a14:hiddenLine xmlns:a14="http://schemas.microsoft.com/office/drawing/2010/main" xmlns="" w="9525">
+              <a14:hiddenLine xmlns="" xmlns:a14="http://schemas.microsoft.com/office/drawing/2010/main" w="9525">
                 <a:solidFill>
                   <a:srgbClr val="000000"/>
                 </a:solidFill>
@@ -11761,14 +11761,14 @@
           </a:ln>
           <a:extLst>
             <a:ext uri="{909E8E84-426E-40dd-AFC4-6F175D3DCCD1}">
-              <a14:hiddenFill xmlns:a14="http://schemas.microsoft.com/office/drawing/2010/main" xmlns="">
+              <a14:hiddenFill xmlns="" xmlns:a14="http://schemas.microsoft.com/office/drawing/2010/main">
                 <a:solidFill>
                   <a:srgbClr val="FFFFFF"/>
                 </a:solidFill>
               </a14:hiddenFill>
             </a:ext>
             <a:ext uri="{91240B29-F687-4f45-9708-019B960494DF}">
-              <a14:hiddenLine xmlns:a14="http://schemas.microsoft.com/office/drawing/2010/main" xmlns="" w="9525">
+              <a14:hiddenLine xmlns="" xmlns:a14="http://schemas.microsoft.com/office/drawing/2010/main" w="9525">
                 <a:solidFill>
                   <a:srgbClr val="000000"/>
                 </a:solidFill>
@@ -12326,14 +12326,14 @@
           </a:ln>
           <a:extLst>
             <a:ext uri="{909E8E84-426E-40dd-AFC4-6F175D3DCCD1}">
-              <a14:hiddenFill xmlns:a14="http://schemas.microsoft.com/office/drawing/2010/main" xmlns="">
+              <a14:hiddenFill xmlns="" xmlns:a14="http://schemas.microsoft.com/office/drawing/2010/main">
                 <a:solidFill>
                   <a:srgbClr val="FFFFFF"/>
                 </a:solidFill>
               </a14:hiddenFill>
             </a:ext>
             <a:ext uri="{91240B29-F687-4f45-9708-019B960494DF}">
-              <a14:hiddenLine xmlns:a14="http://schemas.microsoft.com/office/drawing/2010/main" xmlns="" w="9525">
+              <a14:hiddenLine xmlns="" xmlns:a14="http://schemas.microsoft.com/office/drawing/2010/main" w="9525">
                 <a:solidFill>
                   <a:srgbClr val="000000"/>
                 </a:solidFill>
@@ -12900,14 +12900,14 @@
           </a:ln>
           <a:extLst>
             <a:ext uri="{909E8E84-426E-40dd-AFC4-6F175D3DCCD1}">
-              <a14:hiddenFill xmlns:a14="http://schemas.microsoft.com/office/drawing/2010/main" xmlns="">
+              <a14:hiddenFill xmlns="" xmlns:a14="http://schemas.microsoft.com/office/drawing/2010/main">
                 <a:solidFill>
                   <a:srgbClr val="FFFFFF"/>
                 </a:solidFill>
               </a14:hiddenFill>
             </a:ext>
             <a:ext uri="{91240B29-F687-4f45-9708-019B960494DF}">
-              <a14:hiddenLine xmlns:a14="http://schemas.microsoft.com/office/drawing/2010/main" xmlns="" w="9525">
+              <a14:hiddenLine xmlns="" xmlns:a14="http://schemas.microsoft.com/office/drawing/2010/main" w="9525">
                 <a:solidFill>
                   <a:srgbClr val="000000"/>
                 </a:solidFill>
@@ -13847,14 +13847,14 @@
           </a:ln>
           <a:extLst>
             <a:ext uri="{909E8E84-426E-40dd-AFC4-6F175D3DCCD1}">
-              <a14:hiddenFill xmlns:a14="http://schemas.microsoft.com/office/drawing/2010/main" xmlns="">
+              <a14:hiddenFill xmlns="" xmlns:a14="http://schemas.microsoft.com/office/drawing/2010/main">
                 <a:solidFill>
                   <a:srgbClr val="FFFFFF"/>
                 </a:solidFill>
               </a14:hiddenFill>
             </a:ext>
             <a:ext uri="{91240B29-F687-4f45-9708-019B960494DF}">
-              <a14:hiddenLine xmlns:a14="http://schemas.microsoft.com/office/drawing/2010/main" xmlns="" w="9525">
+              <a14:hiddenLine xmlns="" xmlns:a14="http://schemas.microsoft.com/office/drawing/2010/main" w="9525">
                 <a:solidFill>
                   <a:srgbClr val="000000"/>
                 </a:solidFill>
@@ -14609,14 +14609,14 @@
           </a:ln>
           <a:extLst>
             <a:ext uri="{909E8E84-426E-40dd-AFC4-6F175D3DCCD1}">
-              <a14:hiddenFill xmlns:a14="http://schemas.microsoft.com/office/drawing/2010/main" xmlns="">
+              <a14:hiddenFill xmlns="" xmlns:a14="http://schemas.microsoft.com/office/drawing/2010/main">
                 <a:solidFill>
                   <a:srgbClr val="FFFFFF"/>
                 </a:solidFill>
               </a14:hiddenFill>
             </a:ext>
             <a:ext uri="{91240B29-F687-4f45-9708-019B960494DF}">
-              <a14:hiddenLine xmlns:a14="http://schemas.microsoft.com/office/drawing/2010/main" xmlns="" w="9525">
+              <a14:hiddenLine xmlns="" xmlns:a14="http://schemas.microsoft.com/office/drawing/2010/main" w="9525">
                 <a:solidFill>
                   <a:srgbClr val="000000"/>
                 </a:solidFill>
@@ -25866,15 +25866,7 @@
           <a:p>
             <a:r>
               <a:rPr lang="en-US" dirty="0"/>
-              <a:t>----&gt; Starting Kitchen (v</a:t>
-            </a:r>
-            <a:r>
-              <a:rPr lang="nb-NO" dirty="0"/>
-              <a:t>1.11.1</a:t>
-            </a:r>
-            <a:r>
-              <a:rPr lang="en-US" dirty="0"/>
-              <a:t>)</a:t>
+              <a:t>----&gt; Starting Kitchen (v1.19.2)</a:t>
             </a:r>
           </a:p>
           <a:p>
@@ -29784,6 +29776,15 @@
 
 <file path=customXml/item1.xml><?xml version="1.0" encoding="utf-8"?>
 <?mso-contentType ?>
+<FormTemplates xmlns="http://schemas.microsoft.com/sharepoint/v3/contenttype/forms">
+  <Display>DocumentLibraryForm</Display>
+  <Edit>DocumentLibraryForm</Edit>
+  <New>DocumentLibraryForm</New>
+</FormTemplates>
+</file>
+
+<file path=customXml/item2.xml><?xml version="1.0" encoding="utf-8"?>
+<?mso-contentType ?>
 <spe:Receivers xmlns:spe="http://schemas.microsoft.com/sharepoint/events">
   <Receiver>
     <Name>Document ID Generator</Name>
@@ -29828,28 +29829,7 @@
 </spe:Receivers>
 </file>
 
-<file path=customXml/item2.xml><?xml version="1.0" encoding="utf-8"?>
-<?mso-contentType ?>
-<FormTemplates xmlns="http://schemas.microsoft.com/sharepoint/v3/contenttype/forms">
-  <Display>DocumentLibraryForm</Display>
-  <Edit>DocumentLibraryForm</Edit>
-  <New>DocumentLibraryForm</New>
-</FormTemplates>
-</file>
-
 <file path=customXml/item3.xml><?xml version="1.0" encoding="utf-8"?>
-<p:properties xmlns:p="http://schemas.microsoft.com/office/2006/metadata/properties" xmlns:xsi="http://www.w3.org/2001/XMLSchema-instance" xmlns:pc="http://schemas.microsoft.com/office/infopath/2007/PartnerControls">
-  <documentManagement>
-    <_dlc_DocId xmlns="7bb5d761-a2ea-4873-95f7-7a6658fb3ef0">M4CWTKMW727E-592-73</_dlc_DocId>
-    <_dlc_DocIdUrl xmlns="7bb5d761-a2ea-4873-95f7-7a6658fb3ef0">
-      <Url>https://kms.vci.local/marketing/team/_layouts/DocIdRedir.aspx?ID=M4CWTKMW727E-592-73</Url>
-      <Description>M4CWTKMW727E-592-73</Description>
-    </_dlc_DocIdUrl>
-  </documentManagement>
-</p:properties>
-</file>
-
-<file path=customXml/item4.xml><?xml version="1.0" encoding="utf-8"?>
 <ct:contentTypeSchema xmlns:ct="http://schemas.microsoft.com/office/2006/metadata/contentType" xmlns:ma="http://schemas.microsoft.com/office/2006/metadata/properties/metaAttributes" ct:_="" ma:_="" ma:contentTypeName="Document" ma:contentTypeID="0x0101000812F700BE7F874999720E88173FE491" ma:contentTypeVersion="0" ma:contentTypeDescription="Create a new document." ma:contentTypeScope="" ma:versionID="3f79f408e2ca720b7aba6e0e32464d0c">
   <xsd:schema xmlns:xsd="http://www.w3.org/2001/XMLSchema" xmlns:xs="http://www.w3.org/2001/XMLSchema" xmlns:p="http://schemas.microsoft.com/office/2006/metadata/properties" xmlns:ns2="7bb5d761-a2ea-4873-95f7-7a6658fb3ef0" targetNamespace="http://schemas.microsoft.com/office/2006/metadata/properties" ma:root="true" ma:fieldsID="1e062cd38ba31e406bfc4340fbc7f87a" ns2:_="">
     <xsd:import namespace="7bb5d761-a2ea-4873-95f7-7a6658fb3ef0"/>
@@ -29994,7 +29974,27 @@
 </ct:contentTypeSchema>
 </file>
 
+<file path=customXml/item4.xml><?xml version="1.0" encoding="utf-8"?>
+<p:properties xmlns:p="http://schemas.microsoft.com/office/2006/metadata/properties" xmlns:xsi="http://www.w3.org/2001/XMLSchema-instance" xmlns:pc="http://schemas.microsoft.com/office/infopath/2007/PartnerControls">
+  <documentManagement>
+    <_dlc_DocId xmlns="7bb5d761-a2ea-4873-95f7-7a6658fb3ef0">M4CWTKMW727E-592-73</_dlc_DocId>
+    <_dlc_DocIdUrl xmlns="7bb5d761-a2ea-4873-95f7-7a6658fb3ef0">
+      <Url>https://kms.vci.local/marketing/team/_layouts/DocIdRedir.aspx?ID=M4CWTKMW727E-592-73</Url>
+      <Description>M4CWTKMW727E-592-73</Description>
+    </_dlc_DocIdUrl>
+  </documentManagement>
+</p:properties>
+</file>
+
 <file path=customXml/itemProps1.xml><?xml version="1.0" encoding="utf-8"?>
+<ds:datastoreItem xmlns:ds="http://schemas.openxmlformats.org/officeDocument/2006/customXml" ds:itemID="{5CDEB364-43EC-4510-9881-539C2A3FCE9E}">
+  <ds:schemaRefs>
+    <ds:schemaRef ds:uri="http://schemas.microsoft.com/sharepoint/v3/contenttype/forms"/>
+  </ds:schemaRefs>
+</ds:datastoreItem>
+</file>
+
+<file path=customXml/itemProps2.xml><?xml version="1.0" encoding="utf-8"?>
 <ds:datastoreItem xmlns:ds="http://schemas.openxmlformats.org/officeDocument/2006/customXml" ds:itemID="{B13EBC30-FE27-4C6A-B723-23FC2188F7DC}">
   <ds:schemaRefs>
     <ds:schemaRef ds:uri="http://schemas.microsoft.com/sharepoint/events"/>
@@ -30002,31 +30002,7 @@
 </ds:datastoreItem>
 </file>
 
-<file path=customXml/itemProps2.xml><?xml version="1.0" encoding="utf-8"?>
-<ds:datastoreItem xmlns:ds="http://schemas.openxmlformats.org/officeDocument/2006/customXml" ds:itemID="{5CDEB364-43EC-4510-9881-539C2A3FCE9E}">
-  <ds:schemaRefs>
-    <ds:schemaRef ds:uri="http://schemas.microsoft.com/sharepoint/v3/contenttype/forms"/>
-  </ds:schemaRefs>
-</ds:datastoreItem>
-</file>
-
 <file path=customXml/itemProps3.xml><?xml version="1.0" encoding="utf-8"?>
-<ds:datastoreItem xmlns:ds="http://schemas.openxmlformats.org/officeDocument/2006/customXml" ds:itemID="{6921749B-AEB7-461B-845F-603CABD25259}">
-  <ds:schemaRefs>
-    <ds:schemaRef ds:uri="7bb5d761-a2ea-4873-95f7-7a6658fb3ef0"/>
-    <ds:schemaRef ds:uri="http://purl.org/dc/terms/"/>
-    <ds:schemaRef ds:uri="http://schemas.openxmlformats.org/package/2006/metadata/core-properties"/>
-    <ds:schemaRef ds:uri="http://purl.org/dc/dcmitype/"/>
-    <ds:schemaRef ds:uri="http://schemas.microsoft.com/office/2006/documentManagement/types"/>
-    <ds:schemaRef ds:uri="http://purl.org/dc/elements/1.1/"/>
-    <ds:schemaRef ds:uri="http://schemas.microsoft.com/office/2006/metadata/properties"/>
-    <ds:schemaRef ds:uri="http://schemas.microsoft.com/office/infopath/2007/PartnerControls"/>
-    <ds:schemaRef ds:uri="http://www.w3.org/XML/1998/namespace"/>
-  </ds:schemaRefs>
-</ds:datastoreItem>
-</file>
-
-<file path=customXml/itemProps4.xml><?xml version="1.0" encoding="utf-8"?>
 <ds:datastoreItem xmlns:ds="http://schemas.openxmlformats.org/officeDocument/2006/customXml" ds:itemID="{164479E5-0B02-49AC-B79E-EC1D6164DDD3}">
   <ds:schemaRefs>
     <ds:schemaRef ds:uri="http://schemas.microsoft.com/office/2006/metadata/contentType"/>
@@ -30042,4 +30018,20 @@
     <ds:schemaRef ds:uri="http://schemas.microsoft.com/internal/obd"/>
   </ds:schemaRefs>
 </ds:datastoreItem>
+</file>
+
+<file path=customXml/itemProps4.xml><?xml version="1.0" encoding="utf-8"?>
+<ds:datastoreItem xmlns:ds="http://schemas.openxmlformats.org/officeDocument/2006/customXml" ds:itemID="{6921749B-AEB7-461B-845F-603CABD25259}">
+  <ds:schemaRefs>
+    <ds:schemaRef ds:uri="http://purl.org/dc/elements/1.1/"/>
+    <ds:schemaRef ds:uri="http://schemas.microsoft.com/office/2006/metadata/properties"/>
+    <ds:schemaRef ds:uri="7bb5d761-a2ea-4873-95f7-7a6658fb3ef0"/>
+    <ds:schemaRef ds:uri="http://purl.org/dc/terms/"/>
+    <ds:schemaRef ds:uri="http://schemas.openxmlformats.org/package/2006/metadata/core-properties"/>
+    <ds:schemaRef ds:uri="http://schemas.microsoft.com/office/2006/documentManagement/types"/>
+    <ds:schemaRef ds:uri="http://schemas.microsoft.com/office/infopath/2007/PartnerControls"/>
+    <ds:schemaRef ds:uri="http://www.w3.org/XML/1998/namespace"/>
+    <ds:schemaRef ds:uri="http://purl.org/dc/dcmitype/"/>
+  </ds:schemaRefs>
+</ds:datastoreItem>
 </file>
</xml_diff>